<commit_message>
Chapter 11, 12 slides improved.
</commit_message>
<xml_diff>
--- a/slides/07-Ch11.pptx
+++ b/slides/07-Ch11.pptx
@@ -3694,485 +3694,6 @@
       <dsp:cNvGrpSpPr/>
     </dsp:nvGrpSpPr>
     <dsp:grpSpPr/>
-    <dsp:sp modelId="{EE260587-9D21-4483-A2DA-E8C84578AB66}">
-      <dsp:nvSpPr>
-        <dsp:cNvPr id="0" name=""/>
-        <dsp:cNvSpPr/>
-      </dsp:nvSpPr>
-      <dsp:spPr>
-        <a:xfrm>
-          <a:off x="3610428" y="2949127"/>
-          <a:ext cx="255907" cy="1121119"/>
-        </a:xfrm>
-        <a:custGeom>
-          <a:avLst/>
-          <a:gdLst/>
-          <a:ahLst/>
-          <a:cxnLst/>
-          <a:rect l="0" t="0" r="0" b="0"/>
-          <a:pathLst>
-            <a:path>
-              <a:moveTo>
-                <a:pt x="0" y="0"/>
-              </a:moveTo>
-              <a:lnTo>
-                <a:pt x="0" y="1121119"/>
-              </a:lnTo>
-              <a:lnTo>
-                <a:pt x="255907" y="1121119"/>
-              </a:lnTo>
-            </a:path>
-          </a:pathLst>
-        </a:custGeom>
-        <a:noFill/>
-        <a:ln w="19050" cap="rnd" cmpd="sng" algn="ctr">
-          <a:solidFill>
-            <a:schemeClr val="accent1">
-              <a:shade val="80000"/>
-              <a:hueOff val="0"/>
-              <a:satOff val="0"/>
-              <a:lumOff val="0"/>
-              <a:alphaOff val="0"/>
-            </a:schemeClr>
-          </a:solidFill>
-          <a:prstDash val="solid"/>
-        </a:ln>
-        <a:effectLst/>
-      </dsp:spPr>
-      <dsp:style>
-        <a:lnRef idx="2">
-          <a:scrgbClr r="0" g="0" b="0"/>
-        </a:lnRef>
-        <a:fillRef idx="0">
-          <a:scrgbClr r="0" g="0" b="0"/>
-        </a:fillRef>
-        <a:effectRef idx="0">
-          <a:scrgbClr r="0" g="0" b="0"/>
-        </a:effectRef>
-        <a:fontRef idx="minor"/>
-      </dsp:style>
-    </dsp:sp>
-    <dsp:sp modelId="{D1759400-1F7D-4F6D-9AE5-D729844D6BAB}">
-      <dsp:nvSpPr>
-        <dsp:cNvPr id="0" name=""/>
-        <dsp:cNvSpPr/>
-      </dsp:nvSpPr>
-      <dsp:spPr>
-        <a:xfrm>
-          <a:off x="3354520" y="2949127"/>
-          <a:ext cx="255907" cy="1121119"/>
-        </a:xfrm>
-        <a:custGeom>
-          <a:avLst/>
-          <a:gdLst/>
-          <a:ahLst/>
-          <a:cxnLst/>
-          <a:rect l="0" t="0" r="0" b="0"/>
-          <a:pathLst>
-            <a:path>
-              <a:moveTo>
-                <a:pt x="255907" y="0"/>
-              </a:moveTo>
-              <a:lnTo>
-                <a:pt x="255907" y="1121119"/>
-              </a:lnTo>
-              <a:lnTo>
-                <a:pt x="0" y="1121119"/>
-              </a:lnTo>
-            </a:path>
-          </a:pathLst>
-        </a:custGeom>
-        <a:noFill/>
-        <a:ln w="19050" cap="rnd" cmpd="sng" algn="ctr">
-          <a:solidFill>
-            <a:schemeClr val="accent1">
-              <a:shade val="80000"/>
-              <a:hueOff val="0"/>
-              <a:satOff val="0"/>
-              <a:lumOff val="0"/>
-              <a:alphaOff val="0"/>
-            </a:schemeClr>
-          </a:solidFill>
-          <a:prstDash val="solid"/>
-        </a:ln>
-        <a:effectLst/>
-      </dsp:spPr>
-      <dsp:style>
-        <a:lnRef idx="2">
-          <a:scrgbClr r="0" g="0" b="0"/>
-        </a:lnRef>
-        <a:fillRef idx="0">
-          <a:scrgbClr r="0" g="0" b="0"/>
-        </a:fillRef>
-        <a:effectRef idx="0">
-          <a:scrgbClr r="0" g="0" b="0"/>
-        </a:effectRef>
-        <a:fontRef idx="minor"/>
-      </dsp:style>
-    </dsp:sp>
-    <dsp:sp modelId="{53C8B6DC-B912-479A-A9C1-8B01A20931F5}">
-      <dsp:nvSpPr>
-        <dsp:cNvPr id="0" name=""/>
-        <dsp:cNvSpPr/>
-      </dsp:nvSpPr>
-      <dsp:spPr>
-        <a:xfrm>
-          <a:off x="3564708" y="1218704"/>
-          <a:ext cx="91440" cy="511815"/>
-        </a:xfrm>
-        <a:custGeom>
-          <a:avLst/>
-          <a:gdLst/>
-          <a:ahLst/>
-          <a:cxnLst/>
-          <a:rect l="0" t="0" r="0" b="0"/>
-          <a:pathLst>
-            <a:path>
-              <a:moveTo>
-                <a:pt x="45720" y="0"/>
-              </a:moveTo>
-              <a:lnTo>
-                <a:pt x="45720" y="511815"/>
-              </a:lnTo>
-            </a:path>
-          </a:pathLst>
-        </a:custGeom>
-        <a:noFill/>
-        <a:ln w="19050" cap="rnd" cmpd="sng" algn="ctr">
-          <a:solidFill>
-            <a:schemeClr val="accent1">
-              <a:shade val="60000"/>
-              <a:hueOff val="0"/>
-              <a:satOff val="0"/>
-              <a:lumOff val="0"/>
-              <a:alphaOff val="0"/>
-            </a:schemeClr>
-          </a:solidFill>
-          <a:prstDash val="solid"/>
-        </a:ln>
-        <a:effectLst/>
-      </dsp:spPr>
-      <dsp:style>
-        <a:lnRef idx="2">
-          <a:scrgbClr r="0" g="0" b="0"/>
-        </a:lnRef>
-        <a:fillRef idx="0">
-          <a:scrgbClr r="0" g="0" b="0"/>
-        </a:fillRef>
-        <a:effectRef idx="0">
-          <a:scrgbClr r="0" g="0" b="0"/>
-        </a:effectRef>
-        <a:fontRef idx="minor"/>
-      </dsp:style>
-    </dsp:sp>
-    <dsp:sp modelId="{79C0C358-CAF8-4BCA-8A0F-440144131471}">
-      <dsp:nvSpPr>
-        <dsp:cNvPr id="0" name=""/>
-        <dsp:cNvSpPr/>
-      </dsp:nvSpPr>
-      <dsp:spPr>
-        <a:xfrm>
-          <a:off x="2391820" y="96"/>
-          <a:ext cx="2437215" cy="1218607"/>
-        </a:xfrm>
-        <a:prstGeom prst="rect">
-          <a:avLst/>
-        </a:prstGeom>
-        <a:solidFill>
-          <a:schemeClr val="accent1">
-            <a:hueOff val="0"/>
-            <a:satOff val="0"/>
-            <a:lumOff val="0"/>
-            <a:alphaOff val="0"/>
-          </a:schemeClr>
-        </a:solidFill>
-        <a:ln w="19050" cap="rnd" cmpd="sng" algn="ctr">
-          <a:solidFill>
-            <a:schemeClr val="lt1">
-              <a:hueOff val="0"/>
-              <a:satOff val="0"/>
-              <a:lumOff val="0"/>
-              <a:alphaOff val="0"/>
-            </a:schemeClr>
-          </a:solidFill>
-          <a:prstDash val="solid"/>
-        </a:ln>
-        <a:effectLst/>
-      </dsp:spPr>
-      <dsp:style>
-        <a:lnRef idx="2">
-          <a:scrgbClr r="0" g="0" b="0"/>
-        </a:lnRef>
-        <a:fillRef idx="1">
-          <a:scrgbClr r="0" g="0" b="0"/>
-        </a:fillRef>
-        <a:effectRef idx="0">
-          <a:scrgbClr r="0" g="0" b="0"/>
-        </a:effectRef>
-        <a:fontRef idx="minor">
-          <a:schemeClr val="lt1"/>
-        </a:fontRef>
-      </dsp:style>
-      <dsp:txBody>
-        <a:bodyPr spcFirstLastPara="0" vert="horz" wrap="square" lIns="27305" tIns="27305" rIns="27305" bIns="27305" numCol="1" spcCol="1270" anchor="ctr" anchorCtr="0">
-          <a:noAutofit/>
-        </a:bodyPr>
-        <a:lstStyle/>
-        <a:p>
-          <a:pPr lvl="0" algn="ctr" defTabSz="1911350">
-            <a:lnSpc>
-              <a:spcPct val="90000"/>
-            </a:lnSpc>
-            <a:spcBef>
-              <a:spcPct val="0"/>
-            </a:spcBef>
-            <a:spcAft>
-              <a:spcPct val="35000"/>
-            </a:spcAft>
-          </a:pPr>
-          <a:r>
-            <a:rPr lang="en-US" sz="4300" kern="1200" dirty="0" smtClean="0"/>
-            <a:t>Object</a:t>
-          </a:r>
-          <a:endParaRPr lang="en-US" sz="4300" kern="1200" dirty="0"/>
-        </a:p>
-      </dsp:txBody>
-      <dsp:txXfrm>
-        <a:off x="2391820" y="96"/>
-        <a:ext cx="2437215" cy="1218607"/>
-      </dsp:txXfrm>
-    </dsp:sp>
-    <dsp:sp modelId="{33EA8E37-1810-4E23-B3AA-BD6AA14C747D}">
-      <dsp:nvSpPr>
-        <dsp:cNvPr id="0" name=""/>
-        <dsp:cNvSpPr/>
-      </dsp:nvSpPr>
-      <dsp:spPr>
-        <a:xfrm>
-          <a:off x="1850576" y="1730519"/>
-          <a:ext cx="3519704" cy="1218607"/>
-        </a:xfrm>
-        <a:prstGeom prst="rect">
-          <a:avLst/>
-        </a:prstGeom>
-        <a:solidFill>
-          <a:schemeClr val="accent1">
-            <a:hueOff val="0"/>
-            <a:satOff val="0"/>
-            <a:lumOff val="0"/>
-            <a:alphaOff val="0"/>
-          </a:schemeClr>
-        </a:solidFill>
-        <a:ln w="19050" cap="rnd" cmpd="sng" algn="ctr">
-          <a:solidFill>
-            <a:schemeClr val="lt1">
-              <a:hueOff val="0"/>
-              <a:satOff val="0"/>
-              <a:lumOff val="0"/>
-              <a:alphaOff val="0"/>
-            </a:schemeClr>
-          </a:solidFill>
-          <a:prstDash val="solid"/>
-        </a:ln>
-        <a:effectLst/>
-      </dsp:spPr>
-      <dsp:style>
-        <a:lnRef idx="2">
-          <a:scrgbClr r="0" g="0" b="0"/>
-        </a:lnRef>
-        <a:fillRef idx="1">
-          <a:scrgbClr r="0" g="0" b="0"/>
-        </a:fillRef>
-        <a:effectRef idx="0">
-          <a:scrgbClr r="0" g="0" b="0"/>
-        </a:effectRef>
-        <a:fontRef idx="minor">
-          <a:schemeClr val="lt1"/>
-        </a:fontRef>
-      </dsp:style>
-      <dsp:txBody>
-        <a:bodyPr spcFirstLastPara="0" vert="horz" wrap="square" lIns="27305" tIns="27305" rIns="27305" bIns="27305" numCol="1" spcCol="1270" anchor="ctr" anchorCtr="0">
-          <a:noAutofit/>
-        </a:bodyPr>
-        <a:lstStyle/>
-        <a:p>
-          <a:pPr lvl="0" algn="ctr" defTabSz="1911350">
-            <a:lnSpc>
-              <a:spcPct val="90000"/>
-            </a:lnSpc>
-            <a:spcBef>
-              <a:spcPct val="0"/>
-            </a:spcBef>
-            <a:spcAft>
-              <a:spcPct val="35000"/>
-            </a:spcAft>
-          </a:pPr>
-          <a:r>
-            <a:rPr lang="en-US" sz="4300" kern="1200" dirty="0" err="1" smtClean="0"/>
-            <a:t>Throwable</a:t>
-          </a:r>
-          <a:endParaRPr lang="en-US" sz="4300" kern="1200" dirty="0"/>
-        </a:p>
-      </dsp:txBody>
-      <dsp:txXfrm>
-        <a:off x="1850576" y="1730519"/>
-        <a:ext cx="3519704" cy="1218607"/>
-      </dsp:txXfrm>
-    </dsp:sp>
-    <dsp:sp modelId="{95A4A756-7342-4D11-B0F5-596A19F858B4}">
-      <dsp:nvSpPr>
-        <dsp:cNvPr id="0" name=""/>
-        <dsp:cNvSpPr/>
-      </dsp:nvSpPr>
-      <dsp:spPr>
-        <a:xfrm>
-          <a:off x="917305" y="3460942"/>
-          <a:ext cx="2437215" cy="1218607"/>
-        </a:xfrm>
-        <a:prstGeom prst="rect">
-          <a:avLst/>
-        </a:prstGeom>
-        <a:solidFill>
-          <a:schemeClr val="accent1">
-            <a:hueOff val="0"/>
-            <a:satOff val="0"/>
-            <a:lumOff val="0"/>
-            <a:alphaOff val="0"/>
-          </a:schemeClr>
-        </a:solidFill>
-        <a:ln w="19050" cap="rnd" cmpd="sng" algn="ctr">
-          <a:solidFill>
-            <a:schemeClr val="lt1">
-              <a:hueOff val="0"/>
-              <a:satOff val="0"/>
-              <a:lumOff val="0"/>
-              <a:alphaOff val="0"/>
-            </a:schemeClr>
-          </a:solidFill>
-          <a:prstDash val="solid"/>
-        </a:ln>
-        <a:effectLst/>
-      </dsp:spPr>
-      <dsp:style>
-        <a:lnRef idx="2">
-          <a:scrgbClr r="0" g="0" b="0"/>
-        </a:lnRef>
-        <a:fillRef idx="1">
-          <a:scrgbClr r="0" g="0" b="0"/>
-        </a:fillRef>
-        <a:effectRef idx="0">
-          <a:scrgbClr r="0" g="0" b="0"/>
-        </a:effectRef>
-        <a:fontRef idx="minor">
-          <a:schemeClr val="lt1"/>
-        </a:fontRef>
-      </dsp:style>
-      <dsp:txBody>
-        <a:bodyPr spcFirstLastPara="0" vert="horz" wrap="square" lIns="27305" tIns="27305" rIns="27305" bIns="27305" numCol="1" spcCol="1270" anchor="ctr" anchorCtr="0">
-          <a:noAutofit/>
-        </a:bodyPr>
-        <a:lstStyle/>
-        <a:p>
-          <a:pPr lvl="0" algn="ctr" defTabSz="1911350">
-            <a:lnSpc>
-              <a:spcPct val="90000"/>
-            </a:lnSpc>
-            <a:spcBef>
-              <a:spcPct val="0"/>
-            </a:spcBef>
-            <a:spcAft>
-              <a:spcPct val="35000"/>
-            </a:spcAft>
-          </a:pPr>
-          <a:r>
-            <a:rPr lang="en-US" sz="4300" kern="1200" dirty="0" smtClean="0"/>
-            <a:t>Exception</a:t>
-          </a:r>
-          <a:endParaRPr lang="en-US" sz="4300" kern="1200" dirty="0"/>
-        </a:p>
-      </dsp:txBody>
-      <dsp:txXfrm>
-        <a:off x="917305" y="3460942"/>
-        <a:ext cx="2437215" cy="1218607"/>
-      </dsp:txXfrm>
-    </dsp:sp>
-    <dsp:sp modelId="{4E6D1839-C463-452B-9E7B-CFCF8D14BDDC}">
-      <dsp:nvSpPr>
-        <dsp:cNvPr id="0" name=""/>
-        <dsp:cNvSpPr/>
-      </dsp:nvSpPr>
-      <dsp:spPr>
-        <a:xfrm>
-          <a:off x="3866336" y="3460942"/>
-          <a:ext cx="2437215" cy="1218607"/>
-        </a:xfrm>
-        <a:prstGeom prst="rect">
-          <a:avLst/>
-        </a:prstGeom>
-        <a:solidFill>
-          <a:schemeClr val="accent1">
-            <a:hueOff val="0"/>
-            <a:satOff val="0"/>
-            <a:lumOff val="0"/>
-            <a:alphaOff val="0"/>
-          </a:schemeClr>
-        </a:solidFill>
-        <a:ln w="19050" cap="rnd" cmpd="sng" algn="ctr">
-          <a:solidFill>
-            <a:schemeClr val="lt1">
-              <a:hueOff val="0"/>
-              <a:satOff val="0"/>
-              <a:lumOff val="0"/>
-              <a:alphaOff val="0"/>
-            </a:schemeClr>
-          </a:solidFill>
-          <a:prstDash val="solid"/>
-        </a:ln>
-        <a:effectLst/>
-      </dsp:spPr>
-      <dsp:style>
-        <a:lnRef idx="2">
-          <a:scrgbClr r="0" g="0" b="0"/>
-        </a:lnRef>
-        <a:fillRef idx="1">
-          <a:scrgbClr r="0" g="0" b="0"/>
-        </a:fillRef>
-        <a:effectRef idx="0">
-          <a:scrgbClr r="0" g="0" b="0"/>
-        </a:effectRef>
-        <a:fontRef idx="minor">
-          <a:schemeClr val="lt1"/>
-        </a:fontRef>
-      </dsp:style>
-      <dsp:txBody>
-        <a:bodyPr spcFirstLastPara="0" vert="horz" wrap="square" lIns="27305" tIns="27305" rIns="27305" bIns="27305" numCol="1" spcCol="1270" anchor="ctr" anchorCtr="0">
-          <a:noAutofit/>
-        </a:bodyPr>
-        <a:lstStyle/>
-        <a:p>
-          <a:pPr lvl="0" algn="ctr" defTabSz="1911350">
-            <a:lnSpc>
-              <a:spcPct val="90000"/>
-            </a:lnSpc>
-            <a:spcBef>
-              <a:spcPct val="0"/>
-            </a:spcBef>
-            <a:spcAft>
-              <a:spcPct val="35000"/>
-            </a:spcAft>
-          </a:pPr>
-          <a:r>
-            <a:rPr lang="en-US" sz="4300" kern="1200" dirty="0" smtClean="0"/>
-            <a:t>Error</a:t>
-          </a:r>
-          <a:endParaRPr lang="en-US" sz="4300" kern="1200" dirty="0"/>
-        </a:p>
-      </dsp:txBody>
-      <dsp:txXfrm>
-        <a:off x="3866336" y="3460942"/>
-        <a:ext cx="2437215" cy="1218607"/>
-      </dsp:txXfrm>
-    </dsp:sp>
   </dsp:spTree>
 </dsp:drawing>
 </file>
@@ -8619,7 +8140,7 @@
           <a:p>
             <a:fld id="{BFDAF772-0345-4021-BAAE-C304C8F0BB60}" type="datetimeFigureOut">
               <a:rPr lang="en-US" smtClean="0"/>
-              <a:t>5/10/2015</a:t>
+              <a:t>5/11/2015</a:t>
             </a:fld>
             <a:endParaRPr lang="en-US"/>
           </a:p>
@@ -9241,7 +8762,7 @@
           <a:p>
             <a:fld id="{89EA39F3-0E49-4BA5-BB4A-98E0095F309D}" type="datetime1">
               <a:rPr lang="en-US" smtClean="0"/>
-              <a:t>5/10/2015</a:t>
+              <a:t>5/11/2015</a:t>
             </a:fld>
             <a:endParaRPr lang="en-US"/>
           </a:p>
@@ -9516,7 +9037,7 @@
           <a:p>
             <a:fld id="{24E4D153-8783-41CA-A296-CA93A4806B11}" type="datetime1">
               <a:rPr lang="en-US" smtClean="0"/>
-              <a:t>5/10/2015</a:t>
+              <a:t>5/11/2015</a:t>
             </a:fld>
             <a:endParaRPr lang="en-US"/>
           </a:p>
@@ -9710,7 +9231,7 @@
           <a:p>
             <a:fld id="{C1D08C0A-A0F0-49E8-8E7D-3EBCA6B391C5}" type="datetime1">
               <a:rPr lang="en-US" smtClean="0"/>
-              <a:t>5/10/2015</a:t>
+              <a:t>5/11/2015</a:t>
             </a:fld>
             <a:endParaRPr lang="en-US"/>
           </a:p>
@@ -9983,7 +9504,7 @@
           <a:p>
             <a:fld id="{B3BBF829-DE74-424F-BEB2-67C5DC0C4825}" type="datetime1">
               <a:rPr lang="en-US" smtClean="0"/>
-              <a:t>5/10/2015</a:t>
+              <a:t>5/11/2015</a:t>
             </a:fld>
             <a:endParaRPr lang="en-US"/>
           </a:p>
@@ -10324,7 +9845,7 @@
           <a:p>
             <a:fld id="{C6E16249-C5ED-4D40-8EED-A992763DC12D}" type="datetime1">
               <a:rPr lang="en-US" smtClean="0"/>
-              <a:t>5/10/2015</a:t>
+              <a:t>5/11/2015</a:t>
             </a:fld>
             <a:endParaRPr lang="en-US"/>
           </a:p>
@@ -10947,7 +10468,7 @@
           <a:p>
             <a:fld id="{82987A68-B983-4B62-8820-660B17CA7B41}" type="datetime1">
               <a:rPr lang="en-US" smtClean="0"/>
-              <a:t>5/10/2015</a:t>
+              <a:t>5/11/2015</a:t>
             </a:fld>
             <a:endParaRPr lang="en-US"/>
           </a:p>
@@ -11807,7 +11328,7 @@
           <a:p>
             <a:fld id="{26B65600-91D4-4A6B-A813-9AB3B3B02CFE}" type="datetime1">
               <a:rPr lang="en-US" smtClean="0"/>
-              <a:t>5/10/2015</a:t>
+              <a:t>5/11/2015</a:t>
             </a:fld>
             <a:endParaRPr lang="en-US"/>
           </a:p>
@@ -11977,7 +11498,7 @@
           <a:p>
             <a:fld id="{D8F1D582-D9F3-4D71-A470-A53C76F6C2F8}" type="datetime1">
               <a:rPr lang="en-US" smtClean="0"/>
-              <a:t>5/10/2015</a:t>
+              <a:t>5/11/2015</a:t>
             </a:fld>
             <a:endParaRPr lang="en-US"/>
           </a:p>
@@ -12157,7 +11678,7 @@
           <a:p>
             <a:fld id="{EA7952CA-1CE8-4796-8D70-B28F0BF1A50B}" type="datetime1">
               <a:rPr lang="en-US" smtClean="0"/>
-              <a:t>5/10/2015</a:t>
+              <a:t>5/11/2015</a:t>
             </a:fld>
             <a:endParaRPr lang="en-US"/>
           </a:p>
@@ -12327,7 +11848,7 @@
           <a:p>
             <a:fld id="{A82F7DE3-3C27-4D2B-8EB6-5BD302EA90A9}" type="datetime1">
               <a:rPr lang="en-US" smtClean="0"/>
-              <a:t>5/10/2015</a:t>
+              <a:t>5/11/2015</a:t>
             </a:fld>
             <a:endParaRPr lang="en-US"/>
           </a:p>
@@ -12574,7 +12095,7 @@
           <a:p>
             <a:fld id="{51E79E0B-6AEF-4D23-A7DD-3674F8FEFA8F}" type="datetime1">
               <a:rPr lang="en-US" smtClean="0"/>
-              <a:t>5/10/2015</a:t>
+              <a:t>5/11/2015</a:t>
             </a:fld>
             <a:endParaRPr lang="en-US"/>
           </a:p>
@@ -12866,7 +12387,7 @@
           <a:p>
             <a:fld id="{D1BA6434-8C86-497B-B4D2-FCEBB3EB37FA}" type="datetime1">
               <a:rPr lang="en-US" smtClean="0"/>
-              <a:t>5/10/2015</a:t>
+              <a:t>5/11/2015</a:t>
             </a:fld>
             <a:endParaRPr lang="en-US"/>
           </a:p>
@@ -13310,7 +12831,7 @@
           <a:p>
             <a:fld id="{378DE3B0-FF01-4245-A5A2-893DAAA3CF1F}" type="datetime1">
               <a:rPr lang="en-US" smtClean="0"/>
-              <a:t>5/10/2015</a:t>
+              <a:t>5/11/2015</a:t>
             </a:fld>
             <a:endParaRPr lang="en-US"/>
           </a:p>
@@ -13428,7 +12949,7 @@
           <a:p>
             <a:fld id="{2EC07CF9-3E0D-4771-9B35-19356A1F04FA}" type="datetime1">
               <a:rPr lang="en-US" smtClean="0"/>
-              <a:t>5/10/2015</a:t>
+              <a:t>5/11/2015</a:t>
             </a:fld>
             <a:endParaRPr lang="en-US"/>
           </a:p>
@@ -13523,7 +13044,7 @@
           <a:p>
             <a:fld id="{EFA0DD6E-BC5B-45F4-BE9B-B2B7A5158BEE}" type="datetime1">
               <a:rPr lang="en-US" smtClean="0"/>
-              <a:t>5/10/2015</a:t>
+              <a:t>5/11/2015</a:t>
             </a:fld>
             <a:endParaRPr lang="en-US"/>
           </a:p>
@@ -13802,7 +13323,7 @@
           <a:p>
             <a:fld id="{F1365214-7A4E-49C2-8949-6A4B9B5A70C7}" type="datetime1">
               <a:rPr lang="en-US" smtClean="0"/>
-              <a:t>5/10/2015</a:t>
+              <a:t>5/11/2015</a:t>
             </a:fld>
             <a:endParaRPr lang="en-US"/>
           </a:p>
@@ -14077,7 +13598,7 @@
           <a:p>
             <a:fld id="{8F003529-62C5-4112-80E0-DFBD52EA35F7}" type="datetime1">
               <a:rPr lang="en-US" smtClean="0"/>
-              <a:t>5/10/2015</a:t>
+              <a:t>5/11/2015</a:t>
             </a:fld>
             <a:endParaRPr lang="en-US"/>
           </a:p>
@@ -14506,7 +14027,7 @@
           <a:p>
             <a:fld id="{5FB10833-48C7-4355-B54B-0BBA02CBA17A}" type="datetime1">
               <a:rPr lang="en-US" smtClean="0"/>
-              <a:t>5/10/2015</a:t>
+              <a:t>5/11/2015</a:t>
             </a:fld>
             <a:endParaRPr lang="en-US"/>
           </a:p>
@@ -15539,7 +15060,7 @@
                 </a:solidFill>
                 <a:latin typeface="Arial" panose="020B0604020202020204" pitchFamily="34" charset="0"/>
               </a:rPr>
-              <a:t>Pantea</a:t>
+              <a:t>PanteA</a:t>
             </a:r>
             <a:r>
               <a:rPr lang="en-US" sz="3200" dirty="0" smtClean="0">
@@ -15551,7 +15072,7 @@
               <a:t> </a:t>
             </a:r>
             <a:r>
-              <a:rPr lang="en-US" sz="3200" smtClean="0">
+              <a:rPr lang="en-US" sz="3200" dirty="0" err="1" smtClean="0">
                 <a:solidFill>
                   <a:prstClr val="white"/>
                 </a:solidFill>
@@ -15974,11 +15495,7 @@
             </a:r>
             <a:r>
               <a:rPr lang="en-US" dirty="0" smtClean="0"/>
-              <a:t>exception [meaning </a:t>
-            </a:r>
-            <a:r>
-              <a:rPr lang="en-US" dirty="0" smtClean="0"/>
-              <a:t>it is from the other side of the Exception class hierarchy from </a:t>
+              <a:t>exception [meaning it is from the other side of the Exception class hierarchy from </a:t>
             </a:r>
             <a:r>
               <a:rPr lang="en-US" dirty="0" err="1" smtClean="0"/>
@@ -15992,11 +15509,7 @@
           <a:p>
             <a:r>
               <a:rPr lang="en-US" dirty="0" smtClean="0"/>
-              <a:t>Common </a:t>
-            </a:r>
-            <a:r>
-              <a:rPr lang="en-US" dirty="0" smtClean="0"/>
-              <a:t>checked exceptions are </a:t>
+              <a:t>Common checked exceptions are </a:t>
             </a:r>
             <a:r>
               <a:rPr lang="en-US" dirty="0" err="1" smtClean="0"/>
@@ -16012,11 +15525,7 @@
             </a:r>
             <a:r>
               <a:rPr lang="en-US" dirty="0" smtClean="0"/>
-              <a:t>. Checked exceptions must be listed in the throws part of the method signature if you don't handle them </a:t>
-            </a:r>
-            <a:r>
-              <a:rPr lang="en-US" dirty="0" smtClean="0"/>
-              <a:t>yourself.</a:t>
+              <a:t>. Checked exceptions must be listed in the throws part of the method signature if you don't handle them yourself.</a:t>
             </a:r>
           </a:p>
           <a:p>

</xml_diff>